<commit_message>
add documentation of stimuli-preview frame
</commit_message>
<xml_diff>
--- a/screenshot_diagrams.pptx
+++ b/screenshot_diagrams.pptx
@@ -6,6 +6,7 @@
   </p:sldMasterIdLst>
   <p:sldIdLst>
     <p:sldId id="256" r:id="rId2"/>
+    <p:sldId id="257" r:id="rId3"/>
   </p:sldIdLst>
   <p:sldSz cx="9144000" cy="6858000" type="screen4x3"/>
   <p:notesSz cx="6858000" cy="9144000"/>
@@ -288,7 +289,7 @@
           <a:p>
             <a:fld id="{8F5CB05B-0AF7-B643-B970-77A5E7634B33}" type="datetimeFigureOut">
               <a:rPr lang="en-US" smtClean="0"/>
-              <a:t>4/13/20</a:t>
+              <a:t>4/15/20</a:t>
             </a:fld>
             <a:endParaRPr lang="en-US"/>
           </a:p>
@@ -458,7 +459,7 @@
           <a:p>
             <a:fld id="{8F5CB05B-0AF7-B643-B970-77A5E7634B33}" type="datetimeFigureOut">
               <a:rPr lang="en-US" smtClean="0"/>
-              <a:t>4/13/20</a:t>
+              <a:t>4/15/20</a:t>
             </a:fld>
             <a:endParaRPr lang="en-US"/>
           </a:p>
@@ -638,7 +639,7 @@
           <a:p>
             <a:fld id="{8F5CB05B-0AF7-B643-B970-77A5E7634B33}" type="datetimeFigureOut">
               <a:rPr lang="en-US" smtClean="0"/>
-              <a:t>4/13/20</a:t>
+              <a:t>4/15/20</a:t>
             </a:fld>
             <a:endParaRPr lang="en-US"/>
           </a:p>
@@ -808,7 +809,7 @@
           <a:p>
             <a:fld id="{8F5CB05B-0AF7-B643-B970-77A5E7634B33}" type="datetimeFigureOut">
               <a:rPr lang="en-US" smtClean="0"/>
-              <a:t>4/13/20</a:t>
+              <a:t>4/15/20</a:t>
             </a:fld>
             <a:endParaRPr lang="en-US"/>
           </a:p>
@@ -1054,7 +1055,7 @@
           <a:p>
             <a:fld id="{8F5CB05B-0AF7-B643-B970-77A5E7634B33}" type="datetimeFigureOut">
               <a:rPr lang="en-US" smtClean="0"/>
-              <a:t>4/13/20</a:t>
+              <a:t>4/15/20</a:t>
             </a:fld>
             <a:endParaRPr lang="en-US"/>
           </a:p>
@@ -1342,7 +1343,7 @@
           <a:p>
             <a:fld id="{8F5CB05B-0AF7-B643-B970-77A5E7634B33}" type="datetimeFigureOut">
               <a:rPr lang="en-US" smtClean="0"/>
-              <a:t>4/13/20</a:t>
+              <a:t>4/15/20</a:t>
             </a:fld>
             <a:endParaRPr lang="en-US"/>
           </a:p>
@@ -1764,7 +1765,7 @@
           <a:p>
             <a:fld id="{8F5CB05B-0AF7-B643-B970-77A5E7634B33}" type="datetimeFigureOut">
               <a:rPr lang="en-US" smtClean="0"/>
-              <a:t>4/13/20</a:t>
+              <a:t>4/15/20</a:t>
             </a:fld>
             <a:endParaRPr lang="en-US"/>
           </a:p>
@@ -1882,7 +1883,7 @@
           <a:p>
             <a:fld id="{8F5CB05B-0AF7-B643-B970-77A5E7634B33}" type="datetimeFigureOut">
               <a:rPr lang="en-US" smtClean="0"/>
-              <a:t>4/13/20</a:t>
+              <a:t>4/15/20</a:t>
             </a:fld>
             <a:endParaRPr lang="en-US"/>
           </a:p>
@@ -1977,7 +1978,7 @@
           <a:p>
             <a:fld id="{8F5CB05B-0AF7-B643-B970-77A5E7634B33}" type="datetimeFigureOut">
               <a:rPr lang="en-US" smtClean="0"/>
-              <a:t>4/13/20</a:t>
+              <a:t>4/15/20</a:t>
             </a:fld>
             <a:endParaRPr lang="en-US"/>
           </a:p>
@@ -2254,7 +2255,7 @@
           <a:p>
             <a:fld id="{8F5CB05B-0AF7-B643-B970-77A5E7634B33}" type="datetimeFigureOut">
               <a:rPr lang="en-US" smtClean="0"/>
-              <a:t>4/13/20</a:t>
+              <a:t>4/15/20</a:t>
             </a:fld>
             <a:endParaRPr lang="en-US"/>
           </a:p>
@@ -2507,7 +2508,7 @@
           <a:p>
             <a:fld id="{8F5CB05B-0AF7-B643-B970-77A5E7634B33}" type="datetimeFigureOut">
               <a:rPr lang="en-US" smtClean="0"/>
-              <a:t>4/13/20</a:t>
+              <a:t>4/15/20</a:t>
             </a:fld>
             <a:endParaRPr lang="en-US"/>
           </a:p>
@@ -2720,7 +2721,7 @@
           <a:p>
             <a:fld id="{8F5CB05B-0AF7-B643-B970-77A5E7634B33}" type="datetimeFigureOut">
               <a:rPr lang="en-US" smtClean="0"/>
-              <a:t>4/13/20</a:t>
+              <a:t>4/15/20</a:t>
             </a:fld>
             <a:endParaRPr lang="en-US"/>
           </a:p>
@@ -3980,6 +3981,287 @@
     <p:extLst>
       <p:ext uri="{BB962C8B-B14F-4D97-AF65-F5344CB8AC3E}">
         <p14:creationId xmlns:p14="http://schemas.microsoft.com/office/powerpoint/2010/main" val="2714642010"/>
+      </p:ext>
+    </p:extLst>
+  </p:cSld>
+  <p:clrMapOvr>
+    <a:masterClrMapping/>
+  </p:clrMapOvr>
+</p:sld>
+</file>
+
+<file path=ppt/slides/slide2.xml><?xml version="1.0" encoding="utf-8"?>
+<p:sld xmlns:a="http://schemas.openxmlformats.org/drawingml/2006/main" xmlns:r="http://schemas.openxmlformats.org/officeDocument/2006/relationships" xmlns:p="http://schemas.openxmlformats.org/presentationml/2006/main">
+  <p:cSld>
+    <p:spTree>
+      <p:nvGrpSpPr>
+        <p:cNvPr id="1" name=""/>
+        <p:cNvGrpSpPr/>
+        <p:nvPr/>
+      </p:nvGrpSpPr>
+      <p:grpSpPr>
+        <a:xfrm>
+          <a:off x="0" y="0"/>
+          <a:ext cx="0" cy="0"/>
+          <a:chOff x="0" y="0"/>
+          <a:chExt cx="0" cy="0"/>
+        </a:xfrm>
+      </p:grpSpPr>
+      <p:pic>
+        <p:nvPicPr>
+          <p:cNvPr id="5" name="Picture 4" descr="Screen Shot 2020-04-15 at 5.16.21 PM.png"/>
+          <p:cNvPicPr>
+            <a:picLocks noChangeAspect="1"/>
+          </p:cNvPicPr>
+          <p:nvPr/>
+        </p:nvPicPr>
+        <p:blipFill>
+          <a:blip r:embed="rId2">
+            <a:extLst>
+              <a:ext uri="{28A0092B-C50C-407E-A947-70E740481C1C}">
+                <a14:useLocalDpi xmlns:a14="http://schemas.microsoft.com/office/drawing/2010/main" val="0"/>
+              </a:ext>
+            </a:extLst>
+          </a:blip>
+          <a:stretch>
+            <a:fillRect/>
+          </a:stretch>
+        </p:blipFill>
+        <p:spPr>
+          <a:xfrm>
+            <a:off x="5276485" y="147302"/>
+            <a:ext cx="3061020" cy="2128263"/>
+          </a:xfrm>
+          <a:prstGeom prst="rect">
+            <a:avLst/>
+          </a:prstGeom>
+          <a:ln>
+            <a:solidFill>
+              <a:schemeClr val="tx1"/>
+            </a:solidFill>
+          </a:ln>
+        </p:spPr>
+      </p:pic>
+      <p:pic>
+        <p:nvPicPr>
+          <p:cNvPr id="6" name="Picture 5" descr="Screen Shot 2020-04-15 at 5.16.26 PM.png"/>
+          <p:cNvPicPr>
+            <a:picLocks noChangeAspect="1"/>
+          </p:cNvPicPr>
+          <p:nvPr/>
+        </p:nvPicPr>
+        <p:blipFill>
+          <a:blip r:embed="rId3">
+            <a:extLst>
+              <a:ext uri="{28A0092B-C50C-407E-A947-70E740481C1C}">
+                <a14:useLocalDpi xmlns:a14="http://schemas.microsoft.com/office/drawing/2010/main" val="0"/>
+              </a:ext>
+            </a:extLst>
+          </a:blip>
+          <a:stretch>
+            <a:fillRect/>
+          </a:stretch>
+        </p:blipFill>
+        <p:spPr>
+          <a:xfrm>
+            <a:off x="5266717" y="2353147"/>
+            <a:ext cx="3135386" cy="2128262"/>
+          </a:xfrm>
+          <a:prstGeom prst="rect">
+            <a:avLst/>
+          </a:prstGeom>
+          <a:ln>
+            <a:solidFill>
+              <a:schemeClr val="tx1"/>
+            </a:solidFill>
+          </a:ln>
+        </p:spPr>
+      </p:pic>
+      <p:pic>
+        <p:nvPicPr>
+          <p:cNvPr id="7" name="Picture 6" descr="Screen Shot 2020-04-15 at 5.16.31 PM.png"/>
+          <p:cNvPicPr>
+            <a:picLocks noChangeAspect="1"/>
+          </p:cNvPicPr>
+          <p:nvPr/>
+        </p:nvPicPr>
+        <p:blipFill>
+          <a:blip r:embed="rId4">
+            <a:extLst>
+              <a:ext uri="{28A0092B-C50C-407E-A947-70E740481C1C}">
+                <a14:useLocalDpi xmlns:a14="http://schemas.microsoft.com/office/drawing/2010/main" val="0"/>
+              </a:ext>
+            </a:extLst>
+          </a:blip>
+          <a:stretch>
+            <a:fillRect/>
+          </a:stretch>
+        </p:blipFill>
+        <p:spPr>
+          <a:xfrm>
+            <a:off x="5256948" y="4558991"/>
+            <a:ext cx="3145155" cy="2124312"/>
+          </a:xfrm>
+          <a:prstGeom prst="rect">
+            <a:avLst/>
+          </a:prstGeom>
+          <a:ln>
+            <a:solidFill>
+              <a:schemeClr val="tx1"/>
+            </a:solidFill>
+          </a:ln>
+        </p:spPr>
+      </p:pic>
+      <p:pic>
+        <p:nvPicPr>
+          <p:cNvPr id="8" name="Picture 7" descr="Screen Shot 2020-04-15 at 5.16.03 PM.png"/>
+          <p:cNvPicPr>
+            <a:picLocks noChangeAspect="1"/>
+          </p:cNvPicPr>
+          <p:nvPr/>
+        </p:nvPicPr>
+        <p:blipFill>
+          <a:blip r:embed="rId5">
+            <a:extLst>
+              <a:ext uri="{28A0092B-C50C-407E-A947-70E740481C1C}">
+                <a14:useLocalDpi xmlns:a14="http://schemas.microsoft.com/office/drawing/2010/main" val="0"/>
+              </a:ext>
+            </a:extLst>
+          </a:blip>
+          <a:stretch>
+            <a:fillRect/>
+          </a:stretch>
+        </p:blipFill>
+        <p:spPr>
+          <a:xfrm>
+            <a:off x="195385" y="244230"/>
+            <a:ext cx="4372843" cy="2725435"/>
+          </a:xfrm>
+          <a:prstGeom prst="rect">
+            <a:avLst/>
+          </a:prstGeom>
+          <a:ln>
+            <a:solidFill>
+              <a:schemeClr val="tx1"/>
+            </a:solidFill>
+          </a:ln>
+        </p:spPr>
+      </p:pic>
+      <p:cxnSp>
+        <p:nvCxnSpPr>
+          <p:cNvPr id="9" name="Straight Arrow Connector 8"/>
+          <p:cNvCxnSpPr/>
+          <p:nvPr/>
+        </p:nvCxnSpPr>
+        <p:spPr>
+          <a:xfrm flipV="1">
+            <a:off x="4479360" y="1289008"/>
+            <a:ext cx="915612" cy="1473390"/>
+          </a:xfrm>
+          <a:prstGeom prst="straightConnector1">
+            <a:avLst/>
+          </a:prstGeom>
+          <a:ln>
+            <a:solidFill>
+              <a:schemeClr val="tx1"/>
+            </a:solidFill>
+            <a:tailEnd type="arrow"/>
+          </a:ln>
+          <a:effectLst/>
+        </p:spPr>
+        <p:style>
+          <a:lnRef idx="2">
+            <a:schemeClr val="accent1"/>
+          </a:lnRef>
+          <a:fillRef idx="0">
+            <a:schemeClr val="accent1"/>
+          </a:fillRef>
+          <a:effectRef idx="1">
+            <a:schemeClr val="accent1"/>
+          </a:effectRef>
+          <a:fontRef idx="minor">
+            <a:schemeClr val="tx1"/>
+          </a:fontRef>
+        </p:style>
+      </p:cxnSp>
+      <p:cxnSp>
+        <p:nvCxnSpPr>
+          <p:cNvPr id="13" name="Straight Arrow Connector 12"/>
+          <p:cNvCxnSpPr/>
+          <p:nvPr/>
+        </p:nvCxnSpPr>
+        <p:spPr>
+          <a:xfrm>
+            <a:off x="8174299" y="2191729"/>
+            <a:ext cx="0" cy="723069"/>
+          </a:xfrm>
+          <a:prstGeom prst="straightConnector1">
+            <a:avLst/>
+          </a:prstGeom>
+          <a:ln>
+            <a:solidFill>
+              <a:schemeClr val="tx1"/>
+            </a:solidFill>
+            <a:tailEnd type="arrow"/>
+          </a:ln>
+          <a:effectLst/>
+        </p:spPr>
+        <p:style>
+          <a:lnRef idx="2">
+            <a:schemeClr val="accent1"/>
+          </a:lnRef>
+          <a:fillRef idx="0">
+            <a:schemeClr val="accent1"/>
+          </a:fillRef>
+          <a:effectRef idx="1">
+            <a:schemeClr val="accent1"/>
+          </a:effectRef>
+          <a:fontRef idx="minor">
+            <a:schemeClr val="tx1"/>
+          </a:fontRef>
+        </p:style>
+      </p:cxnSp>
+      <p:cxnSp>
+        <p:nvCxnSpPr>
+          <p:cNvPr id="15" name="Straight Arrow Connector 14"/>
+          <p:cNvCxnSpPr/>
+          <p:nvPr/>
+        </p:nvCxnSpPr>
+        <p:spPr>
+          <a:xfrm>
+            <a:off x="8174977" y="4413867"/>
+            <a:ext cx="0" cy="761262"/>
+          </a:xfrm>
+          <a:prstGeom prst="straightConnector1">
+            <a:avLst/>
+          </a:prstGeom>
+          <a:ln>
+            <a:solidFill>
+              <a:schemeClr val="tx1"/>
+            </a:solidFill>
+            <a:tailEnd type="arrow"/>
+          </a:ln>
+          <a:effectLst/>
+        </p:spPr>
+        <p:style>
+          <a:lnRef idx="2">
+            <a:schemeClr val="accent1"/>
+          </a:lnRef>
+          <a:fillRef idx="0">
+            <a:schemeClr val="accent1"/>
+          </a:fillRef>
+          <a:effectRef idx="1">
+            <a:schemeClr val="accent1"/>
+          </a:effectRef>
+          <a:fontRef idx="minor">
+            <a:schemeClr val="tx1"/>
+          </a:fontRef>
+        </p:style>
+      </p:cxnSp>
+    </p:spTree>
+    <p:extLst>
+      <p:ext uri="{BB962C8B-B14F-4D97-AF65-F5344CB8AC3E}">
+        <p14:creationId xmlns:p14="http://schemas.microsoft.com/office/powerpoint/2010/main" val="3628754956"/>
       </p:ext>
     </p:extLst>
   </p:cSld>

</xml_diff>